<commit_message>
add reset button image and number fonts
</commit_message>
<xml_diff>
--- a/minesweeper/bomb.pptx
+++ b/minesweeper/bomb.pptx
@@ -259,7 +259,7 @@
           <a:p>
             <a:fld id="{EFD3409A-B6E8-48F8-9D4E-D9233736FD52}" type="datetimeFigureOut">
               <a:rPr lang="ko-KR" altLang="en-US" smtClean="0"/>
-              <a:t>2021-01-24</a:t>
+              <a:t>2021-01-30</a:t>
             </a:fld>
             <a:endParaRPr lang="ko-KR" altLang="en-US"/>
           </a:p>
@@ -457,7 +457,7 @@
           <a:p>
             <a:fld id="{EFD3409A-B6E8-48F8-9D4E-D9233736FD52}" type="datetimeFigureOut">
               <a:rPr lang="ko-KR" altLang="en-US" smtClean="0"/>
-              <a:t>2021-01-24</a:t>
+              <a:t>2021-01-30</a:t>
             </a:fld>
             <a:endParaRPr lang="ko-KR" altLang="en-US"/>
           </a:p>
@@ -665,7 +665,7 @@
           <a:p>
             <a:fld id="{EFD3409A-B6E8-48F8-9D4E-D9233736FD52}" type="datetimeFigureOut">
               <a:rPr lang="ko-KR" altLang="en-US" smtClean="0"/>
-              <a:t>2021-01-24</a:t>
+              <a:t>2021-01-30</a:t>
             </a:fld>
             <a:endParaRPr lang="ko-KR" altLang="en-US"/>
           </a:p>
@@ -863,7 +863,7 @@
           <a:p>
             <a:fld id="{EFD3409A-B6E8-48F8-9D4E-D9233736FD52}" type="datetimeFigureOut">
               <a:rPr lang="ko-KR" altLang="en-US" smtClean="0"/>
-              <a:t>2021-01-24</a:t>
+              <a:t>2021-01-30</a:t>
             </a:fld>
             <a:endParaRPr lang="ko-KR" altLang="en-US"/>
           </a:p>
@@ -1138,7 +1138,7 @@
           <a:p>
             <a:fld id="{EFD3409A-B6E8-48F8-9D4E-D9233736FD52}" type="datetimeFigureOut">
               <a:rPr lang="ko-KR" altLang="en-US" smtClean="0"/>
-              <a:t>2021-01-24</a:t>
+              <a:t>2021-01-30</a:t>
             </a:fld>
             <a:endParaRPr lang="ko-KR" altLang="en-US"/>
           </a:p>
@@ -1403,7 +1403,7 @@
           <a:p>
             <a:fld id="{EFD3409A-B6E8-48F8-9D4E-D9233736FD52}" type="datetimeFigureOut">
               <a:rPr lang="ko-KR" altLang="en-US" smtClean="0"/>
-              <a:t>2021-01-24</a:t>
+              <a:t>2021-01-30</a:t>
             </a:fld>
             <a:endParaRPr lang="ko-KR" altLang="en-US"/>
           </a:p>
@@ -1815,7 +1815,7 @@
           <a:p>
             <a:fld id="{EFD3409A-B6E8-48F8-9D4E-D9233736FD52}" type="datetimeFigureOut">
               <a:rPr lang="ko-KR" altLang="en-US" smtClean="0"/>
-              <a:t>2021-01-24</a:t>
+              <a:t>2021-01-30</a:t>
             </a:fld>
             <a:endParaRPr lang="ko-KR" altLang="en-US"/>
           </a:p>
@@ -1956,7 +1956,7 @@
           <a:p>
             <a:fld id="{EFD3409A-B6E8-48F8-9D4E-D9233736FD52}" type="datetimeFigureOut">
               <a:rPr lang="ko-KR" altLang="en-US" smtClean="0"/>
-              <a:t>2021-01-24</a:t>
+              <a:t>2021-01-30</a:t>
             </a:fld>
             <a:endParaRPr lang="ko-KR" altLang="en-US"/>
           </a:p>
@@ -2069,7 +2069,7 @@
           <a:p>
             <a:fld id="{EFD3409A-B6E8-48F8-9D4E-D9233736FD52}" type="datetimeFigureOut">
               <a:rPr lang="ko-KR" altLang="en-US" smtClean="0"/>
-              <a:t>2021-01-24</a:t>
+              <a:t>2021-01-30</a:t>
             </a:fld>
             <a:endParaRPr lang="ko-KR" altLang="en-US"/>
           </a:p>
@@ -2380,7 +2380,7 @@
           <a:p>
             <a:fld id="{EFD3409A-B6E8-48F8-9D4E-D9233736FD52}" type="datetimeFigureOut">
               <a:rPr lang="ko-KR" altLang="en-US" smtClean="0"/>
-              <a:t>2021-01-24</a:t>
+              <a:t>2021-01-30</a:t>
             </a:fld>
             <a:endParaRPr lang="ko-KR" altLang="en-US"/>
           </a:p>
@@ -2668,7 +2668,7 @@
           <a:p>
             <a:fld id="{EFD3409A-B6E8-48F8-9D4E-D9233736FD52}" type="datetimeFigureOut">
               <a:rPr lang="ko-KR" altLang="en-US" smtClean="0"/>
-              <a:t>2021-01-24</a:t>
+              <a:t>2021-01-30</a:t>
             </a:fld>
             <a:endParaRPr lang="ko-KR" altLang="en-US"/>
           </a:p>
@@ -2909,7 +2909,7 @@
           <a:p>
             <a:fld id="{EFD3409A-B6E8-48F8-9D4E-D9233736FD52}" type="datetimeFigureOut">
               <a:rPr lang="ko-KR" altLang="en-US" smtClean="0"/>
-              <a:t>2021-01-24</a:t>
+              <a:t>2021-01-30</a:t>
             </a:fld>
             <a:endParaRPr lang="ko-KR" altLang="en-US"/>
           </a:p>
@@ -3781,6 +3781,353 @@
           </a:p>
         </p:txBody>
       </p:sp>
+      <p:grpSp>
+        <p:nvGrpSpPr>
+          <p:cNvPr id="21" name="그룹 20"/>
+          <p:cNvGrpSpPr/>
+          <p:nvPr/>
+        </p:nvGrpSpPr>
+        <p:grpSpPr>
+          <a:xfrm>
+            <a:off x="6857166" y="2840542"/>
+            <a:ext cx="835339" cy="835339"/>
+            <a:chOff x="6857166" y="2840542"/>
+            <a:chExt cx="835339" cy="835339"/>
+          </a:xfrm>
+        </p:grpSpPr>
+        <p:sp>
+          <p:nvSpPr>
+            <p:cNvPr id="8" name="타원 7"/>
+            <p:cNvSpPr/>
+            <p:nvPr/>
+          </p:nvSpPr>
+          <p:spPr>
+            <a:xfrm>
+              <a:off x="6857166" y="2840542"/>
+              <a:ext cx="835339" cy="835339"/>
+            </a:xfrm>
+            <a:prstGeom prst="ellipse">
+              <a:avLst/>
+            </a:prstGeom>
+            <a:solidFill>
+              <a:srgbClr val="FFFF00"/>
+            </a:solidFill>
+            <a:ln w="38100">
+              <a:solidFill>
+                <a:schemeClr val="tx1"/>
+              </a:solidFill>
+            </a:ln>
+          </p:spPr>
+          <p:style>
+            <a:lnRef idx="2">
+              <a:schemeClr val="accent1">
+                <a:shade val="50000"/>
+              </a:schemeClr>
+            </a:lnRef>
+            <a:fillRef idx="1">
+              <a:schemeClr val="accent1"/>
+            </a:fillRef>
+            <a:effectRef idx="0">
+              <a:schemeClr val="accent1"/>
+            </a:effectRef>
+            <a:fontRef idx="minor">
+              <a:schemeClr val="lt1"/>
+            </a:fontRef>
+          </p:style>
+          <p:txBody>
+            <a:bodyPr rtlCol="0" anchor="ctr"/>
+            <a:lstStyle/>
+            <a:p>
+              <a:pPr algn="ctr"/>
+              <a:endParaRPr lang="ko-KR" altLang="en-US"/>
+            </a:p>
+          </p:txBody>
+        </p:sp>
+        <p:cxnSp>
+          <p:nvCxnSpPr>
+            <p:cNvPr id="11" name="직선 연결선 10"/>
+            <p:cNvCxnSpPr/>
+            <p:nvPr/>
+          </p:nvCxnSpPr>
+          <p:spPr>
+            <a:xfrm>
+              <a:off x="7150029" y="3057647"/>
+              <a:ext cx="0" cy="158838"/>
+            </a:xfrm>
+            <a:prstGeom prst="line">
+              <a:avLst/>
+            </a:prstGeom>
+            <a:ln w="57150">
+              <a:solidFill>
+                <a:schemeClr val="tx1"/>
+              </a:solidFill>
+            </a:ln>
+          </p:spPr>
+          <p:style>
+            <a:lnRef idx="1">
+              <a:schemeClr val="accent1"/>
+            </a:lnRef>
+            <a:fillRef idx="0">
+              <a:schemeClr val="accent1"/>
+            </a:fillRef>
+            <a:effectRef idx="0">
+              <a:schemeClr val="accent1"/>
+            </a:effectRef>
+            <a:fontRef idx="minor">
+              <a:schemeClr val="tx1"/>
+            </a:fontRef>
+          </p:style>
+        </p:cxnSp>
+        <p:cxnSp>
+          <p:nvCxnSpPr>
+            <p:cNvPr id="17" name="직선 연결선 16"/>
+            <p:cNvCxnSpPr/>
+            <p:nvPr/>
+          </p:nvCxnSpPr>
+          <p:spPr>
+            <a:xfrm>
+              <a:off x="7391329" y="3057647"/>
+              <a:ext cx="0" cy="158838"/>
+            </a:xfrm>
+            <a:prstGeom prst="line">
+              <a:avLst/>
+            </a:prstGeom>
+            <a:ln w="57150">
+              <a:solidFill>
+                <a:schemeClr val="tx1"/>
+              </a:solidFill>
+            </a:ln>
+          </p:spPr>
+          <p:style>
+            <a:lnRef idx="1">
+              <a:schemeClr val="accent1"/>
+            </a:lnRef>
+            <a:fillRef idx="0">
+              <a:schemeClr val="accent1"/>
+            </a:fillRef>
+            <a:effectRef idx="0">
+              <a:schemeClr val="accent1"/>
+            </a:effectRef>
+            <a:fontRef idx="minor">
+              <a:schemeClr val="tx1"/>
+            </a:fontRef>
+          </p:style>
+        </p:cxnSp>
+        <p:sp>
+          <p:nvSpPr>
+            <p:cNvPr id="20" name="타원 19"/>
+            <p:cNvSpPr/>
+            <p:nvPr/>
+          </p:nvSpPr>
+          <p:spPr>
+            <a:xfrm>
+              <a:off x="7223607" y="3353940"/>
+              <a:ext cx="102456" cy="152400"/>
+            </a:xfrm>
+            <a:prstGeom prst="ellipse">
+              <a:avLst/>
+            </a:prstGeom>
+            <a:noFill/>
+            <a:ln w="38100">
+              <a:solidFill>
+                <a:schemeClr val="tx1"/>
+              </a:solidFill>
+            </a:ln>
+          </p:spPr>
+          <p:style>
+            <a:lnRef idx="2">
+              <a:schemeClr val="accent1">
+                <a:shade val="50000"/>
+              </a:schemeClr>
+            </a:lnRef>
+            <a:fillRef idx="1">
+              <a:schemeClr val="accent1"/>
+            </a:fillRef>
+            <a:effectRef idx="0">
+              <a:schemeClr val="accent1"/>
+            </a:effectRef>
+            <a:fontRef idx="minor">
+              <a:schemeClr val="lt1"/>
+            </a:fontRef>
+          </p:style>
+          <p:txBody>
+            <a:bodyPr rtlCol="0" anchor="ctr"/>
+            <a:lstStyle/>
+            <a:p>
+              <a:pPr algn="ctr"/>
+              <a:endParaRPr lang="ko-KR" altLang="en-US"/>
+            </a:p>
+          </p:txBody>
+        </p:sp>
+      </p:grpSp>
+      <p:grpSp>
+        <p:nvGrpSpPr>
+          <p:cNvPr id="23" name="그룹 22"/>
+          <p:cNvGrpSpPr/>
+          <p:nvPr/>
+        </p:nvGrpSpPr>
+        <p:grpSpPr>
+          <a:xfrm>
+            <a:off x="7933804" y="2824665"/>
+            <a:ext cx="835339" cy="835339"/>
+            <a:chOff x="6857166" y="2840542"/>
+            <a:chExt cx="835339" cy="835339"/>
+          </a:xfrm>
+        </p:grpSpPr>
+        <p:sp>
+          <p:nvSpPr>
+            <p:cNvPr id="24" name="타원 23"/>
+            <p:cNvSpPr/>
+            <p:nvPr/>
+          </p:nvSpPr>
+          <p:spPr>
+            <a:xfrm>
+              <a:off x="6857166" y="2840542"/>
+              <a:ext cx="835339" cy="835339"/>
+            </a:xfrm>
+            <a:prstGeom prst="ellipse">
+              <a:avLst/>
+            </a:prstGeom>
+            <a:solidFill>
+              <a:srgbClr val="FFFF00"/>
+            </a:solidFill>
+            <a:ln w="38100">
+              <a:solidFill>
+                <a:schemeClr val="tx1"/>
+              </a:solidFill>
+            </a:ln>
+          </p:spPr>
+          <p:style>
+            <a:lnRef idx="2">
+              <a:schemeClr val="accent1">
+                <a:shade val="50000"/>
+              </a:schemeClr>
+            </a:lnRef>
+            <a:fillRef idx="1">
+              <a:schemeClr val="accent1"/>
+            </a:fillRef>
+            <a:effectRef idx="0">
+              <a:schemeClr val="accent1"/>
+            </a:effectRef>
+            <a:fontRef idx="minor">
+              <a:schemeClr val="lt1"/>
+            </a:fontRef>
+          </p:style>
+          <p:txBody>
+            <a:bodyPr rtlCol="0" anchor="ctr"/>
+            <a:lstStyle/>
+            <a:p>
+              <a:pPr algn="ctr"/>
+              <a:endParaRPr lang="ko-KR" altLang="en-US"/>
+            </a:p>
+          </p:txBody>
+        </p:sp>
+        <p:cxnSp>
+          <p:nvCxnSpPr>
+            <p:cNvPr id="25" name="직선 연결선 24"/>
+            <p:cNvCxnSpPr/>
+            <p:nvPr/>
+          </p:nvCxnSpPr>
+          <p:spPr>
+            <a:xfrm>
+              <a:off x="7150029" y="3057647"/>
+              <a:ext cx="0" cy="158838"/>
+            </a:xfrm>
+            <a:prstGeom prst="line">
+              <a:avLst/>
+            </a:prstGeom>
+            <a:ln w="57150">
+              <a:solidFill>
+                <a:schemeClr val="tx1"/>
+              </a:solidFill>
+            </a:ln>
+          </p:spPr>
+          <p:style>
+            <a:lnRef idx="1">
+              <a:schemeClr val="accent1"/>
+            </a:lnRef>
+            <a:fillRef idx="0">
+              <a:schemeClr val="accent1"/>
+            </a:fillRef>
+            <a:effectRef idx="0">
+              <a:schemeClr val="accent1"/>
+            </a:effectRef>
+            <a:fontRef idx="minor">
+              <a:schemeClr val="tx1"/>
+            </a:fontRef>
+          </p:style>
+        </p:cxnSp>
+        <p:cxnSp>
+          <p:nvCxnSpPr>
+            <p:cNvPr id="26" name="직선 연결선 25"/>
+            <p:cNvCxnSpPr/>
+            <p:nvPr/>
+          </p:nvCxnSpPr>
+          <p:spPr>
+            <a:xfrm>
+              <a:off x="7391329" y="3057647"/>
+              <a:ext cx="0" cy="158838"/>
+            </a:xfrm>
+            <a:prstGeom prst="line">
+              <a:avLst/>
+            </a:prstGeom>
+            <a:ln w="57150">
+              <a:solidFill>
+                <a:schemeClr val="tx1"/>
+              </a:solidFill>
+            </a:ln>
+          </p:spPr>
+          <p:style>
+            <a:lnRef idx="1">
+              <a:schemeClr val="accent1"/>
+            </a:lnRef>
+            <a:fillRef idx="0">
+              <a:schemeClr val="accent1"/>
+            </a:fillRef>
+            <a:effectRef idx="0">
+              <a:schemeClr val="accent1"/>
+            </a:effectRef>
+            <a:fontRef idx="minor">
+              <a:schemeClr val="tx1"/>
+            </a:fontRef>
+          </p:style>
+        </p:cxnSp>
+        <p:cxnSp>
+          <p:nvCxnSpPr>
+            <p:cNvPr id="28" name="직선 연결선 27"/>
+            <p:cNvCxnSpPr/>
+            <p:nvPr/>
+          </p:nvCxnSpPr>
+          <p:spPr>
+            <a:xfrm flipH="1">
+              <a:off x="7165269" y="3415772"/>
+              <a:ext cx="227962" cy="0"/>
+            </a:xfrm>
+            <a:prstGeom prst="line">
+              <a:avLst/>
+            </a:prstGeom>
+            <a:ln w="57150">
+              <a:solidFill>
+                <a:schemeClr val="tx1"/>
+              </a:solidFill>
+            </a:ln>
+          </p:spPr>
+          <p:style>
+            <a:lnRef idx="1">
+              <a:schemeClr val="accent1"/>
+            </a:lnRef>
+            <a:fillRef idx="0">
+              <a:schemeClr val="accent1"/>
+            </a:fillRef>
+            <a:effectRef idx="0">
+              <a:schemeClr val="accent1"/>
+            </a:effectRef>
+            <a:fontRef idx="minor">
+              <a:schemeClr val="tx1"/>
+            </a:fontRef>
+          </p:style>
+        </p:cxnSp>
+      </p:grpSp>
     </p:spTree>
     <p:extLst>
       <p:ext uri="{BB962C8B-B14F-4D97-AF65-F5344CB8AC3E}">

</xml_diff>

<commit_message>
add victory face(smile) and save a record
</commit_message>
<xml_diff>
--- a/minesweeper/bomb.pptx
+++ b/minesweeper/bomb.pptx
@@ -259,7 +259,7 @@
           <a:p>
             <a:fld id="{EFD3409A-B6E8-48F8-9D4E-D9233736FD52}" type="datetimeFigureOut">
               <a:rPr lang="ko-KR" altLang="en-US" smtClean="0"/>
-              <a:t>2021-01-30</a:t>
+              <a:t>2021-01-31</a:t>
             </a:fld>
             <a:endParaRPr lang="ko-KR" altLang="en-US"/>
           </a:p>
@@ -457,7 +457,7 @@
           <a:p>
             <a:fld id="{EFD3409A-B6E8-48F8-9D4E-D9233736FD52}" type="datetimeFigureOut">
               <a:rPr lang="ko-KR" altLang="en-US" smtClean="0"/>
-              <a:t>2021-01-30</a:t>
+              <a:t>2021-01-31</a:t>
             </a:fld>
             <a:endParaRPr lang="ko-KR" altLang="en-US"/>
           </a:p>
@@ -665,7 +665,7 @@
           <a:p>
             <a:fld id="{EFD3409A-B6E8-48F8-9D4E-D9233736FD52}" type="datetimeFigureOut">
               <a:rPr lang="ko-KR" altLang="en-US" smtClean="0"/>
-              <a:t>2021-01-30</a:t>
+              <a:t>2021-01-31</a:t>
             </a:fld>
             <a:endParaRPr lang="ko-KR" altLang="en-US"/>
           </a:p>
@@ -863,7 +863,7 @@
           <a:p>
             <a:fld id="{EFD3409A-B6E8-48F8-9D4E-D9233736FD52}" type="datetimeFigureOut">
               <a:rPr lang="ko-KR" altLang="en-US" smtClean="0"/>
-              <a:t>2021-01-30</a:t>
+              <a:t>2021-01-31</a:t>
             </a:fld>
             <a:endParaRPr lang="ko-KR" altLang="en-US"/>
           </a:p>
@@ -1138,7 +1138,7 @@
           <a:p>
             <a:fld id="{EFD3409A-B6E8-48F8-9D4E-D9233736FD52}" type="datetimeFigureOut">
               <a:rPr lang="ko-KR" altLang="en-US" smtClean="0"/>
-              <a:t>2021-01-30</a:t>
+              <a:t>2021-01-31</a:t>
             </a:fld>
             <a:endParaRPr lang="ko-KR" altLang="en-US"/>
           </a:p>
@@ -1403,7 +1403,7 @@
           <a:p>
             <a:fld id="{EFD3409A-B6E8-48F8-9D4E-D9233736FD52}" type="datetimeFigureOut">
               <a:rPr lang="ko-KR" altLang="en-US" smtClean="0"/>
-              <a:t>2021-01-30</a:t>
+              <a:t>2021-01-31</a:t>
             </a:fld>
             <a:endParaRPr lang="ko-KR" altLang="en-US"/>
           </a:p>
@@ -1815,7 +1815,7 @@
           <a:p>
             <a:fld id="{EFD3409A-B6E8-48F8-9D4E-D9233736FD52}" type="datetimeFigureOut">
               <a:rPr lang="ko-KR" altLang="en-US" smtClean="0"/>
-              <a:t>2021-01-30</a:t>
+              <a:t>2021-01-31</a:t>
             </a:fld>
             <a:endParaRPr lang="ko-KR" altLang="en-US"/>
           </a:p>
@@ -1956,7 +1956,7 @@
           <a:p>
             <a:fld id="{EFD3409A-B6E8-48F8-9D4E-D9233736FD52}" type="datetimeFigureOut">
               <a:rPr lang="ko-KR" altLang="en-US" smtClean="0"/>
-              <a:t>2021-01-30</a:t>
+              <a:t>2021-01-31</a:t>
             </a:fld>
             <a:endParaRPr lang="ko-KR" altLang="en-US"/>
           </a:p>
@@ -2069,7 +2069,7 @@
           <a:p>
             <a:fld id="{EFD3409A-B6E8-48F8-9D4E-D9233736FD52}" type="datetimeFigureOut">
               <a:rPr lang="ko-KR" altLang="en-US" smtClean="0"/>
-              <a:t>2021-01-30</a:t>
+              <a:t>2021-01-31</a:t>
             </a:fld>
             <a:endParaRPr lang="ko-KR" altLang="en-US"/>
           </a:p>
@@ -2380,7 +2380,7 @@
           <a:p>
             <a:fld id="{EFD3409A-B6E8-48F8-9D4E-D9233736FD52}" type="datetimeFigureOut">
               <a:rPr lang="ko-KR" altLang="en-US" smtClean="0"/>
-              <a:t>2021-01-30</a:t>
+              <a:t>2021-01-31</a:t>
             </a:fld>
             <a:endParaRPr lang="ko-KR" altLang="en-US"/>
           </a:p>
@@ -2668,7 +2668,7 @@
           <a:p>
             <a:fld id="{EFD3409A-B6E8-48F8-9D4E-D9233736FD52}" type="datetimeFigureOut">
               <a:rPr lang="ko-KR" altLang="en-US" smtClean="0"/>
-              <a:t>2021-01-30</a:t>
+              <a:t>2021-01-31</a:t>
             </a:fld>
             <a:endParaRPr lang="ko-KR" altLang="en-US"/>
           </a:p>
@@ -2909,7 +2909,7 @@
           <a:p>
             <a:fld id="{EFD3409A-B6E8-48F8-9D4E-D9233736FD52}" type="datetimeFigureOut">
               <a:rPr lang="ko-KR" altLang="en-US" smtClean="0"/>
-              <a:t>2021-01-30</a:t>
+              <a:t>2021-01-31</a:t>
             </a:fld>
             <a:endParaRPr lang="ko-KR" altLang="en-US"/>
           </a:p>
@@ -3328,10 +3328,10 @@
       </p:grpSpPr>
       <p:grpSp>
         <p:nvGrpSpPr>
-          <p:cNvPr id="38" name="그룹 37">
-            <a:extLst>
-              <a:ext uri="{FF2B5EF4-FFF2-40B4-BE49-F238E27FC236}">
-                <a16:creationId xmlns:a16="http://schemas.microsoft.com/office/drawing/2014/main" id="{50D74537-2434-48F4-ADA8-131602732CA2}"/>
+          <p:cNvPr id="22" name="그룹 3">
+            <a:extLst>
+              <a:ext uri="{FF2B5EF4-FFF2-40B4-BE49-F238E27FC236}">
+                <a16:creationId xmlns:a16="http://schemas.microsoft.com/office/drawing/2014/main" id="{F0081D3B-0104-43DA-BA45-8A26E7C7D4DC}"/>
               </a:ext>
             </a:extLst>
           </p:cNvPr>
@@ -3348,10 +3348,10 @@
         </p:grpSpPr>
         <p:sp>
           <p:nvSpPr>
-            <p:cNvPr id="4" name="타원 3">
+            <p:cNvPr id="27" name="타원 4">
               <a:extLst>
                 <a:ext uri="{FF2B5EF4-FFF2-40B4-BE49-F238E27FC236}">
-                  <a16:creationId xmlns:a16="http://schemas.microsoft.com/office/drawing/2014/main" id="{09E7E3D4-89B8-459C-864E-4937DBC65680}"/>
+                  <a16:creationId xmlns:a16="http://schemas.microsoft.com/office/drawing/2014/main" id="{CC0419E3-0292-4302-AA46-E3B5F8953FD6}"/>
                 </a:ext>
               </a:extLst>
             </p:cNvPr>
@@ -3402,10 +3402,10 @@
         </p:sp>
         <p:cxnSp>
           <p:nvCxnSpPr>
-            <p:cNvPr id="7" name="직선 연결선 6">
+            <p:cNvPr id="29" name="직선 연결선 5">
               <a:extLst>
                 <a:ext uri="{FF2B5EF4-FFF2-40B4-BE49-F238E27FC236}">
-                  <a16:creationId xmlns:a16="http://schemas.microsoft.com/office/drawing/2014/main" id="{C33E541D-D2F2-4998-8CFC-BC4D94D1F3DF}"/>
+                  <a16:creationId xmlns:a16="http://schemas.microsoft.com/office/drawing/2014/main" id="{6D95DF42-21B7-472A-8C31-1CD5B6EC1024}"/>
                 </a:ext>
               </a:extLst>
             </p:cNvPr>
@@ -3445,10 +3445,10 @@
         </p:cxnSp>
         <p:cxnSp>
           <p:nvCxnSpPr>
-            <p:cNvPr id="9" name="직선 연결선 8">
+            <p:cNvPr id="30" name="직선 연결선 6">
               <a:extLst>
                 <a:ext uri="{FF2B5EF4-FFF2-40B4-BE49-F238E27FC236}">
-                  <a16:creationId xmlns:a16="http://schemas.microsoft.com/office/drawing/2014/main" id="{B2ED1D23-E6AC-41D0-8DBB-A8C4761F92EA}"/>
+                  <a16:creationId xmlns:a16="http://schemas.microsoft.com/office/drawing/2014/main" id="{EBC7C220-4932-435F-8138-1C9AC62D00EB}"/>
                 </a:ext>
               </a:extLst>
             </p:cNvPr>
@@ -3488,10 +3488,10 @@
         </p:cxnSp>
         <p:cxnSp>
           <p:nvCxnSpPr>
-            <p:cNvPr id="13" name="직선 연결선 12">
+            <p:cNvPr id="31" name="직선 연결선 7">
               <a:extLst>
                 <a:ext uri="{FF2B5EF4-FFF2-40B4-BE49-F238E27FC236}">
-                  <a16:creationId xmlns:a16="http://schemas.microsoft.com/office/drawing/2014/main" id="{99631766-F4F0-42BB-90BD-1868C9BBFE6C}"/>
+                  <a16:creationId xmlns:a16="http://schemas.microsoft.com/office/drawing/2014/main" id="{8D53DADE-4DF2-45D8-AAC4-684733524191}"/>
                 </a:ext>
               </a:extLst>
             </p:cNvPr>
@@ -3531,10 +3531,10 @@
         </p:cxnSp>
         <p:cxnSp>
           <p:nvCxnSpPr>
-            <p:cNvPr id="16" name="직선 연결선 15">
+            <p:cNvPr id="32" name="직선 연결선 8">
               <a:extLst>
                 <a:ext uri="{FF2B5EF4-FFF2-40B4-BE49-F238E27FC236}">
-                  <a16:creationId xmlns:a16="http://schemas.microsoft.com/office/drawing/2014/main" id="{8FC98F93-BAA3-46D4-B35B-9465C681D874}"/>
+                  <a16:creationId xmlns:a16="http://schemas.microsoft.com/office/drawing/2014/main" id="{25257526-A8C9-4EBA-9BB9-CEA704CA8315}"/>
                 </a:ext>
               </a:extLst>
             </p:cNvPr>
@@ -3574,10 +3574,10 @@
         </p:cxnSp>
         <p:sp>
           <p:nvSpPr>
-            <p:cNvPr id="5" name="타원 4">
+            <p:cNvPr id="33" name="타원 9">
               <a:extLst>
                 <a:ext uri="{FF2B5EF4-FFF2-40B4-BE49-F238E27FC236}">
-                  <a16:creationId xmlns:a16="http://schemas.microsoft.com/office/drawing/2014/main" id="{1388BF4B-ED1A-4D76-8355-7BD1E77EE219}"/>
+                  <a16:creationId xmlns:a16="http://schemas.microsoft.com/office/drawing/2014/main" id="{D5C3529B-EC7A-4C0C-8D10-1295B231B390}"/>
                 </a:ext>
               </a:extLst>
             </p:cNvPr>
@@ -3627,10 +3627,10 @@
       </p:grpSp>
       <p:sp>
         <p:nvSpPr>
-          <p:cNvPr id="3" name="직사각형 2">
-            <a:extLst>
-              <a:ext uri="{FF2B5EF4-FFF2-40B4-BE49-F238E27FC236}">
-                <a16:creationId xmlns:a16="http://schemas.microsoft.com/office/drawing/2014/main" id="{B8E994C3-102F-41A0-92E4-4917CE6413CA}"/>
+          <p:cNvPr id="34" name="직사각형 10">
+            <a:extLst>
+              <a:ext uri="{FF2B5EF4-FFF2-40B4-BE49-F238E27FC236}">
+                <a16:creationId xmlns:a16="http://schemas.microsoft.com/office/drawing/2014/main" id="{C57BB49D-1B24-4E9A-84EB-63026E049930}"/>
               </a:ext>
             </a:extLst>
           </p:cNvPr>
@@ -3679,10 +3679,10 @@
       </p:sp>
       <p:sp>
         <p:nvSpPr>
-          <p:cNvPr id="6" name="직사각형 5">
-            <a:extLst>
-              <a:ext uri="{FF2B5EF4-FFF2-40B4-BE49-F238E27FC236}">
-                <a16:creationId xmlns:a16="http://schemas.microsoft.com/office/drawing/2014/main" id="{85F9C2AB-214B-4341-B181-7A4BC68A78A6}"/>
+          <p:cNvPr id="35" name="직사각형 11">
+            <a:extLst>
+              <a:ext uri="{FF2B5EF4-FFF2-40B4-BE49-F238E27FC236}">
+                <a16:creationId xmlns:a16="http://schemas.microsoft.com/office/drawing/2014/main" id="{D29A4941-F50B-4090-91CF-EC74B63A82E7}"/>
               </a:ext>
             </a:extLst>
           </p:cNvPr>
@@ -3731,10 +3731,10 @@
       </p:sp>
       <p:sp>
         <p:nvSpPr>
-          <p:cNvPr id="2" name="이등변 삼각형 1">
-            <a:extLst>
-              <a:ext uri="{FF2B5EF4-FFF2-40B4-BE49-F238E27FC236}">
-                <a16:creationId xmlns:a16="http://schemas.microsoft.com/office/drawing/2014/main" id="{1FCD903F-0AD3-4C21-9DBE-871390F21402}"/>
+          <p:cNvPr id="36" name="이등변 삼각형 12">
+            <a:extLst>
+              <a:ext uri="{FF2B5EF4-FFF2-40B4-BE49-F238E27FC236}">
+                <a16:creationId xmlns:a16="http://schemas.microsoft.com/office/drawing/2014/main" id="{122C7829-B05C-4000-BA69-2C82BC2762EB}"/>
               </a:ext>
             </a:extLst>
           </p:cNvPr>
@@ -3783,7 +3783,13 @@
       </p:sp>
       <p:grpSp>
         <p:nvGrpSpPr>
-          <p:cNvPr id="21" name="그룹 20"/>
+          <p:cNvPr id="37" name="그룹 13">
+            <a:extLst>
+              <a:ext uri="{FF2B5EF4-FFF2-40B4-BE49-F238E27FC236}">
+                <a16:creationId xmlns:a16="http://schemas.microsoft.com/office/drawing/2014/main" id="{34B3FAFE-4D1F-43F1-BC6A-3E7F105001FC}"/>
+              </a:ext>
+            </a:extLst>
+          </p:cNvPr>
           <p:cNvGrpSpPr/>
           <p:nvPr/>
         </p:nvGrpSpPr>
@@ -3797,7 +3803,13 @@
         </p:grpSpPr>
         <p:sp>
           <p:nvSpPr>
-            <p:cNvPr id="8" name="타원 7"/>
+            <p:cNvPr id="39" name="타원 14">
+              <a:extLst>
+                <a:ext uri="{FF2B5EF4-FFF2-40B4-BE49-F238E27FC236}">
+                  <a16:creationId xmlns:a16="http://schemas.microsoft.com/office/drawing/2014/main" id="{2CB8BFC4-E614-4A35-9DF5-CBDD37EBFFB8}"/>
+                </a:ext>
+              </a:extLst>
+            </p:cNvPr>
             <p:cNvSpPr/>
             <p:nvPr/>
           </p:nvSpPr>
@@ -3845,7 +3857,13 @@
         </p:sp>
         <p:cxnSp>
           <p:nvCxnSpPr>
-            <p:cNvPr id="11" name="직선 연결선 10"/>
+            <p:cNvPr id="40" name="직선 연결선 15">
+              <a:extLst>
+                <a:ext uri="{FF2B5EF4-FFF2-40B4-BE49-F238E27FC236}">
+                  <a16:creationId xmlns:a16="http://schemas.microsoft.com/office/drawing/2014/main" id="{17ED2545-C92D-4CDA-A93C-B56C60B2C07D}"/>
+                </a:ext>
+              </a:extLst>
+            </p:cNvPr>
             <p:cNvCxnSpPr/>
             <p:nvPr/>
           </p:nvCxnSpPr>
@@ -3880,7 +3898,13 @@
         </p:cxnSp>
         <p:cxnSp>
           <p:nvCxnSpPr>
-            <p:cNvPr id="17" name="직선 연결선 16"/>
+            <p:cNvPr id="41" name="직선 연결선 16">
+              <a:extLst>
+                <a:ext uri="{FF2B5EF4-FFF2-40B4-BE49-F238E27FC236}">
+                  <a16:creationId xmlns:a16="http://schemas.microsoft.com/office/drawing/2014/main" id="{76D0E4F0-7FCF-4B7E-B25E-956C2AC3CB4D}"/>
+                </a:ext>
+              </a:extLst>
+            </p:cNvPr>
             <p:cNvCxnSpPr/>
             <p:nvPr/>
           </p:nvCxnSpPr>
@@ -3915,7 +3939,13 @@
         </p:cxnSp>
         <p:sp>
           <p:nvSpPr>
-            <p:cNvPr id="20" name="타원 19"/>
+            <p:cNvPr id="42" name="타원 17">
+              <a:extLst>
+                <a:ext uri="{FF2B5EF4-FFF2-40B4-BE49-F238E27FC236}">
+                  <a16:creationId xmlns:a16="http://schemas.microsoft.com/office/drawing/2014/main" id="{6EA8C430-DFF0-4776-9FE1-FD705C27A5DA}"/>
+                </a:ext>
+              </a:extLst>
+            </p:cNvPr>
             <p:cNvSpPr/>
             <p:nvPr/>
           </p:nvSpPr>
@@ -3962,7 +3992,13 @@
       </p:grpSp>
       <p:grpSp>
         <p:nvGrpSpPr>
-          <p:cNvPr id="23" name="그룹 22"/>
+          <p:cNvPr id="43" name="그룹 18">
+            <a:extLst>
+              <a:ext uri="{FF2B5EF4-FFF2-40B4-BE49-F238E27FC236}">
+                <a16:creationId xmlns:a16="http://schemas.microsoft.com/office/drawing/2014/main" id="{A560CEAD-B523-4EB5-AE4B-E94DBE82684C}"/>
+              </a:ext>
+            </a:extLst>
+          </p:cNvPr>
           <p:cNvGrpSpPr/>
           <p:nvPr/>
         </p:nvGrpSpPr>
@@ -3976,7 +4012,13 @@
         </p:grpSpPr>
         <p:sp>
           <p:nvSpPr>
-            <p:cNvPr id="24" name="타원 23"/>
+            <p:cNvPr id="44" name="타원 19">
+              <a:extLst>
+                <a:ext uri="{FF2B5EF4-FFF2-40B4-BE49-F238E27FC236}">
+                  <a16:creationId xmlns:a16="http://schemas.microsoft.com/office/drawing/2014/main" id="{4C0E55CD-F1B1-486A-9CB7-A1F432ED20E0}"/>
+                </a:ext>
+              </a:extLst>
+            </p:cNvPr>
             <p:cNvSpPr/>
             <p:nvPr/>
           </p:nvSpPr>
@@ -4024,7 +4066,13 @@
         </p:sp>
         <p:cxnSp>
           <p:nvCxnSpPr>
-            <p:cNvPr id="25" name="직선 연결선 24"/>
+            <p:cNvPr id="45" name="직선 연결선 20">
+              <a:extLst>
+                <a:ext uri="{FF2B5EF4-FFF2-40B4-BE49-F238E27FC236}">
+                  <a16:creationId xmlns:a16="http://schemas.microsoft.com/office/drawing/2014/main" id="{68CEEC6A-C484-4933-8501-FAB18EC0F5B9}"/>
+                </a:ext>
+              </a:extLst>
+            </p:cNvPr>
             <p:cNvCxnSpPr/>
             <p:nvPr/>
           </p:nvCxnSpPr>
@@ -4059,7 +4107,13 @@
         </p:cxnSp>
         <p:cxnSp>
           <p:nvCxnSpPr>
-            <p:cNvPr id="26" name="직선 연결선 25"/>
+            <p:cNvPr id="46" name="직선 연결선 21">
+              <a:extLst>
+                <a:ext uri="{FF2B5EF4-FFF2-40B4-BE49-F238E27FC236}">
+                  <a16:creationId xmlns:a16="http://schemas.microsoft.com/office/drawing/2014/main" id="{7D8BAEFD-8E1A-4EAC-9818-21083E696E64}"/>
+                </a:ext>
+              </a:extLst>
+            </p:cNvPr>
             <p:cNvCxnSpPr/>
             <p:nvPr/>
           </p:nvCxnSpPr>
@@ -4094,7 +4148,13 @@
         </p:cxnSp>
         <p:cxnSp>
           <p:nvCxnSpPr>
-            <p:cNvPr id="28" name="직선 연결선 27"/>
+            <p:cNvPr id="47" name="직선 연결선 22">
+              <a:extLst>
+                <a:ext uri="{FF2B5EF4-FFF2-40B4-BE49-F238E27FC236}">
+                  <a16:creationId xmlns:a16="http://schemas.microsoft.com/office/drawing/2014/main" id="{ABFD5BE4-8720-4FAC-856D-90B661AAF10F}"/>
+                </a:ext>
+              </a:extLst>
+            </p:cNvPr>
             <p:cNvCxnSpPr/>
             <p:nvPr/>
           </p:nvCxnSpPr>
@@ -4127,6 +4187,604 @@
             </a:fontRef>
           </p:style>
         </p:cxnSp>
+      </p:grpSp>
+      <p:sp>
+        <p:nvSpPr>
+          <p:cNvPr id="48" name="이등변 삼각형 23">
+            <a:extLst>
+              <a:ext uri="{FF2B5EF4-FFF2-40B4-BE49-F238E27FC236}">
+                <a16:creationId xmlns:a16="http://schemas.microsoft.com/office/drawing/2014/main" id="{D0B18763-732F-46E5-94D5-6640A70C1227}"/>
+              </a:ext>
+            </a:extLst>
+          </p:cNvPr>
+          <p:cNvSpPr/>
+          <p:nvPr/>
+        </p:nvSpPr>
+        <p:spPr>
+          <a:xfrm>
+            <a:off x="1912084" y="2467395"/>
+            <a:ext cx="946210" cy="1307588"/>
+          </a:xfrm>
+          <a:prstGeom prst="triangle">
+            <a:avLst/>
+          </a:prstGeom>
+        </p:spPr>
+        <p:style>
+          <a:lnRef idx="2">
+            <a:schemeClr val="accent1">
+              <a:shade val="50000"/>
+            </a:schemeClr>
+          </a:lnRef>
+          <a:fillRef idx="1">
+            <a:schemeClr val="accent1"/>
+          </a:fillRef>
+          <a:effectRef idx="0">
+            <a:schemeClr val="accent1"/>
+          </a:effectRef>
+          <a:fontRef idx="minor">
+            <a:schemeClr val="lt1"/>
+          </a:fontRef>
+        </p:style>
+        <p:txBody>
+          <a:bodyPr rtlCol="0" anchor="ctr"/>
+          <a:lstStyle/>
+          <a:p>
+            <a:pPr algn="ctr"/>
+            <a:endParaRPr lang="ko-KR" altLang="en-US"/>
+          </a:p>
+        </p:txBody>
+      </p:sp>
+      <p:sp>
+        <p:nvSpPr>
+          <p:cNvPr id="49" name="이등변 삼각형 24">
+            <a:extLst>
+              <a:ext uri="{FF2B5EF4-FFF2-40B4-BE49-F238E27FC236}">
+                <a16:creationId xmlns:a16="http://schemas.microsoft.com/office/drawing/2014/main" id="{97EDA425-B934-41C2-99AC-1E0D76E1121B}"/>
+              </a:ext>
+            </a:extLst>
+          </p:cNvPr>
+          <p:cNvSpPr/>
+          <p:nvPr/>
+        </p:nvSpPr>
+        <p:spPr>
+          <a:xfrm>
+            <a:off x="1916190" y="3505360"/>
+            <a:ext cx="941755" cy="265345"/>
+          </a:xfrm>
+          <a:prstGeom prst="triangle">
+            <a:avLst/>
+          </a:prstGeom>
+        </p:spPr>
+        <p:style>
+          <a:lnRef idx="2">
+            <a:schemeClr val="accent1">
+              <a:shade val="50000"/>
+            </a:schemeClr>
+          </a:lnRef>
+          <a:fillRef idx="1">
+            <a:schemeClr val="accent1"/>
+          </a:fillRef>
+          <a:effectRef idx="0">
+            <a:schemeClr val="accent1"/>
+          </a:effectRef>
+          <a:fontRef idx="minor">
+            <a:schemeClr val="lt1"/>
+          </a:fontRef>
+        </p:style>
+        <p:txBody>
+          <a:bodyPr rtlCol="0" anchor="ctr"/>
+          <a:lstStyle/>
+          <a:p>
+            <a:pPr algn="ctr"/>
+            <a:endParaRPr lang="ko-KR" altLang="en-US"/>
+          </a:p>
+        </p:txBody>
+      </p:sp>
+      <p:sp>
+        <p:nvSpPr>
+          <p:cNvPr id="50" name="자유형: 도형 25">
+            <a:extLst>
+              <a:ext uri="{FF2B5EF4-FFF2-40B4-BE49-F238E27FC236}">
+                <a16:creationId xmlns:a16="http://schemas.microsoft.com/office/drawing/2014/main" id="{85D8632B-37CD-4F1F-8C91-FB1DA2749C07}"/>
+              </a:ext>
+            </a:extLst>
+          </p:cNvPr>
+          <p:cNvSpPr/>
+          <p:nvPr/>
+        </p:nvSpPr>
+        <p:spPr>
+          <a:xfrm>
+            <a:off x="1756811" y="3261737"/>
+            <a:ext cx="234950" cy="409575"/>
+          </a:xfrm>
+          <a:custGeom>
+            <a:avLst/>
+            <a:gdLst>
+              <a:gd name="connsiteX0" fmla="*/ 117475 w 234950"/>
+              <a:gd name="connsiteY0" fmla="*/ 0 h 409575"/>
+              <a:gd name="connsiteX1" fmla="*/ 0 w 234950"/>
+              <a:gd name="connsiteY1" fmla="*/ 409575 h 409575"/>
+              <a:gd name="connsiteX2" fmla="*/ 117475 w 234950"/>
+              <a:gd name="connsiteY2" fmla="*/ 339725 h 409575"/>
+              <a:gd name="connsiteX3" fmla="*/ 234950 w 234950"/>
+              <a:gd name="connsiteY3" fmla="*/ 400050 h 409575"/>
+              <a:gd name="connsiteX4" fmla="*/ 117475 w 234950"/>
+              <a:gd name="connsiteY4" fmla="*/ 0 h 409575"/>
+            </a:gdLst>
+            <a:ahLst/>
+            <a:cxnLst>
+              <a:cxn ang="0">
+                <a:pos x="connsiteX0" y="connsiteY0"/>
+              </a:cxn>
+              <a:cxn ang="0">
+                <a:pos x="connsiteX1" y="connsiteY1"/>
+              </a:cxn>
+              <a:cxn ang="0">
+                <a:pos x="connsiteX2" y="connsiteY2"/>
+              </a:cxn>
+              <a:cxn ang="0">
+                <a:pos x="connsiteX3" y="connsiteY3"/>
+              </a:cxn>
+              <a:cxn ang="0">
+                <a:pos x="connsiteX4" y="connsiteY4"/>
+              </a:cxn>
+            </a:cxnLst>
+            <a:rect l="l" t="t" r="r" b="b"/>
+            <a:pathLst>
+              <a:path w="234950" h="409575">
+                <a:moveTo>
+                  <a:pt x="117475" y="0"/>
+                </a:moveTo>
+                <a:lnTo>
+                  <a:pt x="0" y="409575"/>
+                </a:lnTo>
+                <a:lnTo>
+                  <a:pt x="117475" y="339725"/>
+                </a:lnTo>
+                <a:lnTo>
+                  <a:pt x="234950" y="400050"/>
+                </a:lnTo>
+                <a:lnTo>
+                  <a:pt x="117475" y="0"/>
+                </a:lnTo>
+                <a:close/>
+              </a:path>
+            </a:pathLst>
+          </a:custGeom>
+        </p:spPr>
+        <p:style>
+          <a:lnRef idx="2">
+            <a:schemeClr val="accent1">
+              <a:shade val="50000"/>
+            </a:schemeClr>
+          </a:lnRef>
+          <a:fillRef idx="1">
+            <a:schemeClr val="accent1"/>
+          </a:fillRef>
+          <a:effectRef idx="0">
+            <a:schemeClr val="accent1"/>
+          </a:effectRef>
+          <a:fontRef idx="minor">
+            <a:schemeClr val="lt1"/>
+          </a:fontRef>
+        </p:style>
+        <p:txBody>
+          <a:bodyPr rtlCol="0" anchor="ctr"/>
+          <a:lstStyle/>
+          <a:p>
+            <a:pPr algn="ctr"/>
+            <a:endParaRPr lang="ko-KR" altLang="en-US"/>
+          </a:p>
+        </p:txBody>
+      </p:sp>
+      <p:sp>
+        <p:nvSpPr>
+          <p:cNvPr id="51" name="직사각형 26">
+            <a:extLst>
+              <a:ext uri="{FF2B5EF4-FFF2-40B4-BE49-F238E27FC236}">
+                <a16:creationId xmlns:a16="http://schemas.microsoft.com/office/drawing/2014/main" id="{DEE4DF0F-BA67-4C4B-9322-AAB5D6BE550E}"/>
+              </a:ext>
+            </a:extLst>
+          </p:cNvPr>
+          <p:cNvSpPr/>
+          <p:nvPr/>
+        </p:nvSpPr>
+        <p:spPr>
+          <a:xfrm>
+            <a:off x="2261288" y="3551782"/>
+            <a:ext cx="253638" cy="734881"/>
+          </a:xfrm>
+          <a:prstGeom prst="rect">
+            <a:avLst/>
+          </a:prstGeom>
+        </p:spPr>
+        <p:style>
+          <a:lnRef idx="2">
+            <a:schemeClr val="accent1">
+              <a:shade val="50000"/>
+            </a:schemeClr>
+          </a:lnRef>
+          <a:fillRef idx="1">
+            <a:schemeClr val="accent1"/>
+          </a:fillRef>
+          <a:effectRef idx="0">
+            <a:schemeClr val="accent1"/>
+          </a:effectRef>
+          <a:fontRef idx="minor">
+            <a:schemeClr val="lt1"/>
+          </a:fontRef>
+        </p:style>
+        <p:txBody>
+          <a:bodyPr rtlCol="0" anchor="ctr"/>
+          <a:lstStyle/>
+          <a:p>
+            <a:pPr algn="ctr"/>
+            <a:endParaRPr lang="ko-KR" altLang="en-US"/>
+          </a:p>
+        </p:txBody>
+      </p:sp>
+      <p:sp>
+        <p:nvSpPr>
+          <p:cNvPr id="52" name="자유형: 도형 27">
+            <a:extLst>
+              <a:ext uri="{FF2B5EF4-FFF2-40B4-BE49-F238E27FC236}">
+                <a16:creationId xmlns:a16="http://schemas.microsoft.com/office/drawing/2014/main" id="{5C252594-09E4-4B1B-9452-7C59FABBD2ED}"/>
+              </a:ext>
+            </a:extLst>
+          </p:cNvPr>
+          <p:cNvSpPr/>
+          <p:nvPr/>
+        </p:nvSpPr>
+        <p:spPr>
+          <a:xfrm rot="20051684">
+            <a:off x="2885913" y="2518594"/>
+            <a:ext cx="638429" cy="887796"/>
+          </a:xfrm>
+          <a:custGeom>
+            <a:avLst/>
+            <a:gdLst>
+              <a:gd name="connsiteX0" fmla="*/ 358775 w 962025"/>
+              <a:gd name="connsiteY0" fmla="*/ 1120775 h 1797050"/>
+              <a:gd name="connsiteX1" fmla="*/ 358775 w 962025"/>
+              <a:gd name="connsiteY1" fmla="*/ 1797050 h 1797050"/>
+              <a:gd name="connsiteX2" fmla="*/ 612775 w 962025"/>
+              <a:gd name="connsiteY2" fmla="*/ 1797050 h 1797050"/>
+              <a:gd name="connsiteX3" fmla="*/ 612775 w 962025"/>
+              <a:gd name="connsiteY3" fmla="*/ 1114425 h 1797050"/>
+              <a:gd name="connsiteX4" fmla="*/ 962025 w 962025"/>
+              <a:gd name="connsiteY4" fmla="*/ 1311275 h 1797050"/>
+              <a:gd name="connsiteX5" fmla="*/ 479425 w 962025"/>
+              <a:gd name="connsiteY5" fmla="*/ 0 h 1797050"/>
+              <a:gd name="connsiteX6" fmla="*/ 0 w 962025"/>
+              <a:gd name="connsiteY6" fmla="*/ 1330325 h 1797050"/>
+              <a:gd name="connsiteX7" fmla="*/ 358775 w 962025"/>
+              <a:gd name="connsiteY7" fmla="*/ 1120775 h 1797050"/>
+            </a:gdLst>
+            <a:ahLst/>
+            <a:cxnLst>
+              <a:cxn ang="0">
+                <a:pos x="connsiteX0" y="connsiteY0"/>
+              </a:cxn>
+              <a:cxn ang="0">
+                <a:pos x="connsiteX1" y="connsiteY1"/>
+              </a:cxn>
+              <a:cxn ang="0">
+                <a:pos x="connsiteX2" y="connsiteY2"/>
+              </a:cxn>
+              <a:cxn ang="0">
+                <a:pos x="connsiteX3" y="connsiteY3"/>
+              </a:cxn>
+              <a:cxn ang="0">
+                <a:pos x="connsiteX4" y="connsiteY4"/>
+              </a:cxn>
+              <a:cxn ang="0">
+                <a:pos x="connsiteX5" y="connsiteY5"/>
+              </a:cxn>
+              <a:cxn ang="0">
+                <a:pos x="connsiteX6" y="connsiteY6"/>
+              </a:cxn>
+              <a:cxn ang="0">
+                <a:pos x="connsiteX7" y="connsiteY7"/>
+              </a:cxn>
+            </a:cxnLst>
+            <a:rect l="l" t="t" r="r" b="b"/>
+            <a:pathLst>
+              <a:path w="962025" h="1797050">
+                <a:moveTo>
+                  <a:pt x="358775" y="1120775"/>
+                </a:moveTo>
+                <a:lnTo>
+                  <a:pt x="358775" y="1797050"/>
+                </a:lnTo>
+                <a:lnTo>
+                  <a:pt x="612775" y="1797050"/>
+                </a:lnTo>
+                <a:lnTo>
+                  <a:pt x="612775" y="1114425"/>
+                </a:lnTo>
+                <a:lnTo>
+                  <a:pt x="962025" y="1311275"/>
+                </a:lnTo>
+                <a:lnTo>
+                  <a:pt x="479425" y="0"/>
+                </a:lnTo>
+                <a:lnTo>
+                  <a:pt x="0" y="1330325"/>
+                </a:lnTo>
+                <a:lnTo>
+                  <a:pt x="358775" y="1120775"/>
+                </a:lnTo>
+                <a:close/>
+              </a:path>
+            </a:pathLst>
+          </a:custGeom>
+          <a:solidFill>
+            <a:schemeClr val="bg1">
+              <a:lumMod val="85000"/>
+            </a:schemeClr>
+          </a:solidFill>
+          <a:ln w="38100">
+            <a:solidFill>
+              <a:schemeClr val="bg1">
+                <a:lumMod val="50000"/>
+              </a:schemeClr>
+            </a:solidFill>
+          </a:ln>
+        </p:spPr>
+        <p:style>
+          <a:lnRef idx="2">
+            <a:schemeClr val="accent1">
+              <a:shade val="50000"/>
+            </a:schemeClr>
+          </a:lnRef>
+          <a:fillRef idx="1">
+            <a:schemeClr val="accent1"/>
+          </a:fillRef>
+          <a:effectRef idx="0">
+            <a:schemeClr val="accent1"/>
+          </a:effectRef>
+          <a:fontRef idx="minor">
+            <a:schemeClr val="lt1"/>
+          </a:fontRef>
+        </p:style>
+        <p:txBody>
+          <a:bodyPr rtlCol="0" anchor="ctr"/>
+          <a:lstStyle/>
+          <a:p>
+            <a:pPr algn="ctr"/>
+            <a:endParaRPr lang="ko-KR" altLang="en-US"/>
+          </a:p>
+        </p:txBody>
+      </p:sp>
+      <p:grpSp>
+        <p:nvGrpSpPr>
+          <p:cNvPr id="53" name="그룹 28">
+            <a:extLst>
+              <a:ext uri="{FF2B5EF4-FFF2-40B4-BE49-F238E27FC236}">
+                <a16:creationId xmlns:a16="http://schemas.microsoft.com/office/drawing/2014/main" id="{0AFEFEDF-DF8E-448A-A2F4-5F5E85F677F9}"/>
+              </a:ext>
+            </a:extLst>
+          </p:cNvPr>
+          <p:cNvGrpSpPr/>
+          <p:nvPr/>
+        </p:nvGrpSpPr>
+        <p:grpSpPr>
+          <a:xfrm>
+            <a:off x="6908393" y="4308637"/>
+            <a:ext cx="835339" cy="835339"/>
+            <a:chOff x="6844998" y="4139568"/>
+            <a:chExt cx="835339" cy="835339"/>
+          </a:xfrm>
+        </p:grpSpPr>
+        <p:grpSp>
+          <p:nvGrpSpPr>
+            <p:cNvPr id="54" name="그룹 29">
+              <a:extLst>
+                <a:ext uri="{FF2B5EF4-FFF2-40B4-BE49-F238E27FC236}">
+                  <a16:creationId xmlns:a16="http://schemas.microsoft.com/office/drawing/2014/main" id="{48497ED6-DC44-4238-B1A5-BFF92F013E99}"/>
+                </a:ext>
+              </a:extLst>
+            </p:cNvPr>
+            <p:cNvGrpSpPr/>
+            <p:nvPr/>
+          </p:nvGrpSpPr>
+          <p:grpSpPr>
+            <a:xfrm>
+              <a:off x="6844998" y="4139568"/>
+              <a:ext cx="835339" cy="835339"/>
+              <a:chOff x="6844034" y="2833375"/>
+              <a:chExt cx="835339" cy="835339"/>
+            </a:xfrm>
+          </p:grpSpPr>
+          <p:sp>
+            <p:nvSpPr>
+              <p:cNvPr id="56" name="타원 31">
+                <a:extLst>
+                  <a:ext uri="{FF2B5EF4-FFF2-40B4-BE49-F238E27FC236}">
+                    <a16:creationId xmlns:a16="http://schemas.microsoft.com/office/drawing/2014/main" id="{1B3EC84A-47F9-4E69-8FBC-3F8235DD01A8}"/>
+                  </a:ext>
+                </a:extLst>
+              </p:cNvPr>
+              <p:cNvSpPr/>
+              <p:nvPr/>
+            </p:nvSpPr>
+            <p:spPr>
+              <a:xfrm>
+                <a:off x="6844034" y="2833375"/>
+                <a:ext cx="835339" cy="835339"/>
+              </a:xfrm>
+              <a:prstGeom prst="ellipse">
+                <a:avLst/>
+              </a:prstGeom>
+              <a:solidFill>
+                <a:srgbClr val="FFFF00"/>
+              </a:solidFill>
+              <a:ln w="38100">
+                <a:solidFill>
+                  <a:schemeClr val="tx1"/>
+                </a:solidFill>
+              </a:ln>
+            </p:spPr>
+            <p:style>
+              <a:lnRef idx="2">
+                <a:schemeClr val="accent1">
+                  <a:shade val="50000"/>
+                </a:schemeClr>
+              </a:lnRef>
+              <a:fillRef idx="1">
+                <a:schemeClr val="accent1"/>
+              </a:fillRef>
+              <a:effectRef idx="0">
+                <a:schemeClr val="accent1"/>
+              </a:effectRef>
+              <a:fontRef idx="minor">
+                <a:schemeClr val="lt1"/>
+              </a:fontRef>
+            </p:style>
+            <p:txBody>
+              <a:bodyPr rtlCol="0" anchor="ctr"/>
+              <a:lstStyle/>
+              <a:p>
+                <a:pPr algn="ctr"/>
+                <a:endParaRPr lang="ko-KR" altLang="en-US"/>
+              </a:p>
+            </p:txBody>
+          </p:sp>
+          <p:cxnSp>
+            <p:nvCxnSpPr>
+              <p:cNvPr id="57" name="직선 연결선 32">
+                <a:extLst>
+                  <a:ext uri="{FF2B5EF4-FFF2-40B4-BE49-F238E27FC236}">
+                    <a16:creationId xmlns:a16="http://schemas.microsoft.com/office/drawing/2014/main" id="{A0BEEA7B-C911-405C-BD13-C4B3FF02B965}"/>
+                  </a:ext>
+                </a:extLst>
+              </p:cNvPr>
+              <p:cNvCxnSpPr/>
+              <p:nvPr/>
+            </p:nvCxnSpPr>
+            <p:spPr>
+              <a:xfrm>
+                <a:off x="7150029" y="3057647"/>
+                <a:ext cx="0" cy="158838"/>
+              </a:xfrm>
+              <a:prstGeom prst="line">
+                <a:avLst/>
+              </a:prstGeom>
+              <a:ln w="57150">
+                <a:solidFill>
+                  <a:schemeClr val="tx1"/>
+                </a:solidFill>
+              </a:ln>
+            </p:spPr>
+            <p:style>
+              <a:lnRef idx="1">
+                <a:schemeClr val="accent1"/>
+              </a:lnRef>
+              <a:fillRef idx="0">
+                <a:schemeClr val="accent1"/>
+              </a:fillRef>
+              <a:effectRef idx="0">
+                <a:schemeClr val="accent1"/>
+              </a:effectRef>
+              <a:fontRef idx="minor">
+                <a:schemeClr val="tx1"/>
+              </a:fontRef>
+            </p:style>
+          </p:cxnSp>
+          <p:cxnSp>
+            <p:nvCxnSpPr>
+              <p:cNvPr id="58" name="직선 연결선 33">
+                <a:extLst>
+                  <a:ext uri="{FF2B5EF4-FFF2-40B4-BE49-F238E27FC236}">
+                    <a16:creationId xmlns:a16="http://schemas.microsoft.com/office/drawing/2014/main" id="{BAB317DA-5188-495F-A110-5889B3C759B9}"/>
+                  </a:ext>
+                </a:extLst>
+              </p:cNvPr>
+              <p:cNvCxnSpPr/>
+              <p:nvPr/>
+            </p:nvCxnSpPr>
+            <p:spPr>
+              <a:xfrm>
+                <a:off x="7391329" y="3057647"/>
+                <a:ext cx="0" cy="158838"/>
+              </a:xfrm>
+              <a:prstGeom prst="line">
+                <a:avLst/>
+              </a:prstGeom>
+              <a:ln w="57150">
+                <a:solidFill>
+                  <a:schemeClr val="tx1"/>
+                </a:solidFill>
+              </a:ln>
+            </p:spPr>
+            <p:style>
+              <a:lnRef idx="1">
+                <a:schemeClr val="accent1"/>
+              </a:lnRef>
+              <a:fillRef idx="0">
+                <a:schemeClr val="accent1"/>
+              </a:fillRef>
+              <a:effectRef idx="0">
+                <a:schemeClr val="accent1"/>
+              </a:effectRef>
+              <a:fontRef idx="minor">
+                <a:schemeClr val="tx1"/>
+              </a:fontRef>
+            </p:style>
+          </p:cxnSp>
+        </p:grpSp>
+        <p:sp>
+          <p:nvSpPr>
+            <p:cNvPr id="55" name="원호 30">
+              <a:extLst>
+                <a:ext uri="{FF2B5EF4-FFF2-40B4-BE49-F238E27FC236}">
+                  <a16:creationId xmlns:a16="http://schemas.microsoft.com/office/drawing/2014/main" id="{CF443709-EFE2-4EC3-BD96-A0B03D962702}"/>
+                </a:ext>
+              </a:extLst>
+            </p:cNvPr>
+            <p:cNvSpPr/>
+            <p:nvPr/>
+          </p:nvSpPr>
+          <p:spPr>
+            <a:xfrm rot="19303000" flipH="1" flipV="1">
+              <a:off x="7104461" y="4473238"/>
+              <a:ext cx="340747" cy="340747"/>
+            </a:xfrm>
+            <a:prstGeom prst="arc">
+              <a:avLst>
+                <a:gd name="adj1" fmla="val 13942517"/>
+                <a:gd name="adj2" fmla="val 1308814"/>
+              </a:avLst>
+            </a:prstGeom>
+            <a:ln w="28575">
+              <a:solidFill>
+                <a:schemeClr val="tx1"/>
+              </a:solidFill>
+            </a:ln>
+          </p:spPr>
+          <p:style>
+            <a:lnRef idx="1">
+              <a:schemeClr val="dk1"/>
+            </a:lnRef>
+            <a:fillRef idx="0">
+              <a:schemeClr val="dk1"/>
+            </a:fillRef>
+            <a:effectRef idx="0">
+              <a:schemeClr val="dk1"/>
+            </a:effectRef>
+            <a:fontRef idx="minor">
+              <a:schemeClr val="tx1"/>
+            </a:fontRef>
+          </p:style>
+          <p:txBody>
+            <a:bodyPr rtlCol="0" anchor="ctr"/>
+            <a:lstStyle/>
+            <a:p>
+              <a:pPr algn="ctr"/>
+              <a:endParaRPr lang="ko-KR" altLang="en-US"/>
+            </a:p>
+          </p:txBody>
+        </p:sp>
       </p:grpSp>
     </p:spTree>
     <p:extLst>

</xml_diff>